<commit_message>
[KerSynthSound] Add testPlan add documentation and update power point presentation.
</commit_message>
<xml_diff>
--- a/Pr�sentation  KSS.pptx
+++ b/Pr�sentation  KSS.pptx
@@ -211,7 +211,7 @@
             <a:fld id="{BA750214-D79C-4976-A36A-D979C44BDE85}" type="datetimeFigureOut">
               <a:rPr lang="fr-FR" smtClean="0"/>
               <a:pPr/>
-              <a:t>29/02/2012</a:t>
+              <a:t>01/03/2012</a:t>
             </a:fld>
             <a:endParaRPr lang="fr-FR"/>
           </a:p>
@@ -374,7 +374,7 @@
             <a:fld id="{BE5DD2CE-FC32-47F2-89AA-829A2D035810}" type="datetimeFigureOut">
               <a:rPr lang="fr-FR" smtClean="0"/>
               <a:pPr/>
-              <a:t>29/02/2012</a:t>
+              <a:t>01/03/2012</a:t>
             </a:fld>
             <a:endParaRPr lang="fr-FR"/>
           </a:p>
@@ -3873,7 +3873,7 @@
         <p:spPr>
           <a:xfrm>
             <a:off x="971600" y="1988840"/>
-            <a:ext cx="7128792" cy="3231654"/>
+            <a:ext cx="7128792" cy="3754874"/>
           </a:xfrm>
           <a:prstGeom prst="rect">
             <a:avLst/>
@@ -3896,18 +3896,7 @@
                   </a:schemeClr>
                 </a:solidFill>
               </a:rPr>
-              <a:t>Projet </a:t>
-            </a:r>
-            <a:r>
-              <a:rPr lang="fr-FR" sz="6000" dirty="0" smtClean="0">
-                <a:solidFill>
-                  <a:schemeClr val="tx2">
-                    <a:lumMod val="60000"/>
-                    <a:lumOff val="40000"/>
-                  </a:schemeClr>
-                </a:solidFill>
-              </a:rPr>
-              <a:t>: </a:t>
+              <a:t>Projet : </a:t>
             </a:r>
             <a:r>
               <a:rPr lang="fr-FR" sz="6000" dirty="0" err="1" smtClean="0">
@@ -3964,6 +3953,20 @@
             <a:r>
               <a:rPr lang="fr-FR" sz="1600" dirty="0" smtClean="0"/>
               <a:t> </a:t>
+            </a:r>
+            <a:endParaRPr lang="fr-FR" sz="1600" dirty="0" smtClean="0"/>
+          </a:p>
+          <a:p>
+            <a:pPr algn="ctr"/>
+            <a:endParaRPr lang="fr-FR" dirty="0" smtClean="0"/>
+          </a:p>
+          <a:p>
+            <a:pPr algn="ctr"/>
+            <a:r>
+              <a:rPr lang="fr-FR" dirty="0" smtClean="0">
+                <a:hlinkClick r:id="rId4"/>
+              </a:rPr>
+              <a:t>http://code.google.com/p/kersynthlab</a:t>
             </a:r>
             <a:endParaRPr lang="fr-FR" dirty="0" smtClean="0"/>
           </a:p>
@@ -4085,7 +4088,7 @@
         </p:nvSpPr>
         <p:spPr>
           <a:xfrm>
-            <a:off x="251520" y="1340768"/>
+            <a:off x="251520" y="1484784"/>
             <a:ext cx="8568952" cy="3024336"/>
           </a:xfrm>
           <a:prstGeom prst="rect">
@@ -4194,18 +4197,7 @@
                   </a:schemeClr>
                 </a:solidFill>
               </a:rPr>
-              <a:t>Tests </a:t>
-            </a:r>
-            <a:r>
-              <a:rPr lang="fr-FR" dirty="0" smtClean="0">
-                <a:solidFill>
-                  <a:schemeClr val="tx2">
-                    <a:lumMod val="60000"/>
-                    <a:lumOff val="40000"/>
-                  </a:schemeClr>
-                </a:solidFill>
-              </a:rPr>
-              <a:t>Unitaires </a:t>
+              <a:t>Tests Unitaires </a:t>
             </a:r>
             <a:endParaRPr lang="fr-FR" dirty="0">
               <a:solidFill>
@@ -5158,7 +5150,7 @@
                   </a:schemeClr>
                 </a:solidFill>
               </a:rPr>
-              <a:t>Impl</a:t>
+              <a:t>ImplTest</a:t>
             </a:r>
             <a:endParaRPr lang="fr-FR" u="sng" dirty="0">
               <a:solidFill>
@@ -5180,7 +5172,7 @@
         <p:spPr>
           <a:xfrm>
             <a:off x="323528" y="4725144"/>
-            <a:ext cx="1368152" cy="369332"/>
+            <a:ext cx="1656184" cy="369332"/>
           </a:xfrm>
           <a:prstGeom prst="rect">
             <a:avLst/>
@@ -5201,7 +5193,7 @@
                   </a:schemeClr>
                 </a:solidFill>
               </a:rPr>
-              <a:t>InPortImpl</a:t>
+              <a:t>InPortImplTest</a:t>
             </a:r>
             <a:endParaRPr lang="fr-FR" u="sng" dirty="0">
               <a:solidFill>
@@ -5326,12 +5318,13 @@
             </a:r>
             <a:r>
               <a:rPr lang="fr-FR" sz="2600" i="1" dirty="0" err="1" smtClean="0"/>
-              <a:t>TestHorlogeImpl</a:t>
+              <a:t>TestHorlogeImplTest</a:t>
             </a:r>
             <a:r>
               <a:rPr lang="fr-FR" sz="2600" i="1" dirty="0" smtClean="0"/>
               <a:t>)</a:t>
             </a:r>
+            <a:endParaRPr lang="fr-FR" sz="2600" i="1" dirty="0" smtClean="0"/>
           </a:p>
           <a:p>
             <a:pPr lvl="1">
@@ -5355,16 +5348,13 @@
             </a:r>
             <a:r>
               <a:rPr lang="fr-FR" dirty="0" smtClean="0"/>
-              <a:t> ( un port d’entrée observe un module et </a:t>
+              <a:t> ( un port d’entrée observe un module et transfère bien l’échantillon </a:t>
             </a:r>
             <a:r>
               <a:rPr lang="fr-FR" dirty="0" smtClean="0"/>
-              <a:t>transfère bien </a:t>
-            </a:r>
-            <a:r>
-              <a:rPr lang="fr-FR" dirty="0" smtClean="0"/>
-              <a:t>l’échantillon </a:t>
-            </a:r>
+              <a:t>)</a:t>
+            </a:r>
+            <a:endParaRPr lang="fr-FR" dirty="0" smtClean="0"/>
           </a:p>
           <a:p>
             <a:r>
@@ -5372,12 +5362,8 @@
               <a:t>Nous avons réalisé les tests fonctionnels et d’intégration  à partir de l’IHM en </a:t>
             </a:r>
             <a:r>
-              <a:rPr lang="fr-FR" dirty="0" err="1" smtClean="0"/>
-              <a:t>creant</a:t>
-            </a:r>
-            <a:r>
               <a:rPr lang="fr-FR" dirty="0" smtClean="0"/>
-              <a:t> </a:t>
+              <a:t>créant </a:t>
             </a:r>
             <a:r>
               <a:rPr lang="fr-FR" dirty="0" smtClean="0"/>
@@ -5853,11 +5839,7 @@
             </a:pPr>
             <a:r>
               <a:rPr lang="fr-FR" dirty="0" smtClean="0"/>
-              <a:t>1- L’implémentation  </a:t>
-            </a:r>
-            <a:r>
-              <a:rPr lang="fr-FR" dirty="0" smtClean="0"/>
-              <a:t>en parallèle du </a:t>
+              <a:t>1- L’implémentation  en parallèle du </a:t>
             </a:r>
             <a:r>
               <a:rPr lang="fr-FR" dirty="0" err="1" smtClean="0"/>
@@ -5865,11 +5847,7 @@
             </a:r>
             <a:r>
               <a:rPr lang="fr-FR" dirty="0" smtClean="0"/>
-              <a:t>  </a:t>
-            </a:r>
-            <a:r>
-              <a:rPr lang="fr-FR" dirty="0" smtClean="0"/>
-              <a:t>s’est avérée  être un mauvais choix , donc implémentation en séquentielle  plus robuste et plus simple à mettre en œuvre </a:t>
+              <a:t>  s’est avérée  être un mauvais choix , donc implémentation en séquentielle  plus robuste et plus simple à mettre en œuvre </a:t>
             </a:r>
           </a:p>
           <a:p>
@@ -5913,11 +5891,7 @@
             </a:r>
             <a:r>
               <a:rPr lang="fr-FR" dirty="0" smtClean="0"/>
-              <a:t>-factoring </a:t>
-            </a:r>
-            <a:r>
-              <a:rPr lang="fr-FR" dirty="0" smtClean="0"/>
-              <a:t>sur certaines classes .</a:t>
+              <a:t>-factoring sur certaines classes .</a:t>
             </a:r>
           </a:p>
           <a:p>
@@ -6582,7 +6556,7 @@
         <p:spPr>
           <a:xfrm>
             <a:off x="971600" y="1772816"/>
-            <a:ext cx="7992888" cy="3200876"/>
+            <a:ext cx="7992888" cy="4493538"/>
           </a:xfrm>
           <a:prstGeom prst="rect">
             <a:avLst/>
@@ -6635,8 +6609,38 @@
             </a:pPr>
             <a:r>
               <a:rPr lang="fr-FR" sz="2800" dirty="0" smtClean="0"/>
-              <a:t>Possibilité  pour chacun des acteurs   de s’exprimer sur son retour d’expérience  </a:t>
-            </a:r>
+              <a:t>Possibilité  pour chacun des acteurs   de s’exprimer sur son retour d’expérience </a:t>
+            </a:r>
+            <a:endParaRPr lang="fr-FR" sz="2800" dirty="0" smtClean="0"/>
+          </a:p>
+          <a:p>
+            <a:pPr>
+              <a:buFont typeface="Arial" pitchFamily="34" charset="0"/>
+              <a:buChar char="•"/>
+            </a:pPr>
+            <a:endParaRPr lang="fr-FR" sz="2800" dirty="0" smtClean="0"/>
+          </a:p>
+          <a:p>
+            <a:pPr>
+              <a:buFont typeface="Arial" pitchFamily="34" charset="0"/>
+              <a:buChar char="•"/>
+            </a:pPr>
+            <a:endParaRPr lang="fr-FR" sz="2800" dirty="0" smtClean="0"/>
+          </a:p>
+          <a:p>
+            <a:pPr>
+              <a:buFont typeface="Arial" pitchFamily="34" charset="0"/>
+              <a:buChar char="•"/>
+            </a:pPr>
+            <a:r>
+              <a:rPr lang="fr-FR" sz="2800" dirty="0" smtClean="0"/>
+              <a:t>Solution qui correspond à 50% des besoins exprimés</a:t>
+            </a:r>
+            <a:r>
+              <a:rPr lang="fr-FR" sz="2800" dirty="0" smtClean="0"/>
+              <a:t> </a:t>
+            </a:r>
+            <a:endParaRPr lang="fr-FR" sz="2800" dirty="0" smtClean="0"/>
           </a:p>
           <a:p>
             <a:endParaRPr lang="fr-FR" dirty="0"/>
@@ -6680,6 +6684,13 @@
   <p:clrMapOvr>
     <a:masterClrMapping/>
   </p:clrMapOvr>
+  <p:timing>
+    <p:tnLst>
+      <p:par>
+        <p:cTn id="1" dur="indefinite" restart="never" nodeType="tmRoot"/>
+      </p:par>
+    </p:tnLst>
+  </p:timing>
 </p:sld>
 </file>
 
@@ -7601,7 +7612,7 @@
         </p:blipFill>
         <p:spPr>
           <a:xfrm>
-            <a:off x="539552" y="5589240"/>
+            <a:off x="539552" y="5661248"/>
             <a:ext cx="1344149" cy="1008112"/>
           </a:xfrm>
           <a:prstGeom prst="rect">
@@ -7852,46 +7863,6 @@
       </p:sp>
       <p:sp>
         <p:nvSpPr>
-          <p:cNvPr id="19" name="Rectangle 18"/>
-          <p:cNvSpPr/>
-          <p:nvPr/>
-        </p:nvSpPr>
-        <p:spPr>
-          <a:xfrm>
-            <a:off x="521550" y="4797152"/>
-            <a:ext cx="1368152" cy="720080"/>
-          </a:xfrm>
-          <a:prstGeom prst="rect">
-            <a:avLst/>
-          </a:prstGeom>
-        </p:spPr>
-        <p:style>
-          <a:lnRef idx="2">
-            <a:schemeClr val="accent1">
-              <a:shade val="50000"/>
-            </a:schemeClr>
-          </a:lnRef>
-          <a:fillRef idx="1">
-            <a:schemeClr val="accent1"/>
-          </a:fillRef>
-          <a:effectRef idx="0">
-            <a:schemeClr val="accent1"/>
-          </a:effectRef>
-          <a:fontRef idx="minor">
-            <a:schemeClr val="lt1"/>
-          </a:fontRef>
-        </p:style>
-        <p:txBody>
-          <a:bodyPr rtlCol="0" anchor="ctr"/>
-          <a:lstStyle/>
-          <a:p>
-            <a:pPr algn="ctr"/>
-            <a:endParaRPr lang="fr-FR"/>
-          </a:p>
-        </p:txBody>
-      </p:sp>
-      <p:sp>
-        <p:nvSpPr>
           <p:cNvPr id="20" name="Espace réservé de la date 19"/>
           <p:cNvSpPr>
             <a:spLocks noGrp="1"/>
@@ -7976,8 +7947,32 @@
         </p:blipFill>
         <p:spPr>
           <a:xfrm>
-            <a:off x="539552" y="1502786"/>
-            <a:ext cx="1296144" cy="972108"/>
+            <a:off x="467544" y="1556792"/>
+            <a:ext cx="1368152" cy="972108"/>
+          </a:xfrm>
+          <a:prstGeom prst="rect">
+            <a:avLst/>
+          </a:prstGeom>
+        </p:spPr>
+      </p:pic>
+      <p:pic>
+        <p:nvPicPr>
+          <p:cNvPr id="24" name="Image 23" descr="olivier.jpg"/>
+          <p:cNvPicPr>
+            <a:picLocks noChangeAspect="1"/>
+          </p:cNvPicPr>
+          <p:nvPr/>
+        </p:nvPicPr>
+        <p:blipFill>
+          <a:blip r:embed="rId7" cstate="print"/>
+          <a:stretch>
+            <a:fillRect/>
+          </a:stretch>
+        </p:blipFill>
+        <p:spPr>
+          <a:xfrm>
+            <a:off x="539552" y="4725144"/>
+            <a:ext cx="1320147" cy="864096"/>
           </a:xfrm>
           <a:prstGeom prst="rect">
             <a:avLst/>
@@ -8186,25 +8181,15 @@
             </a:r>
             <a:r>
               <a:rPr lang="fr-FR" dirty="0" smtClean="0"/>
-              <a:t>: </a:t>
-            </a:r>
+              <a:t>: 	</a:t>
+            </a:r>
+          </a:p>
+          <a:p>
+            <a:pPr lvl="1"/>
             <a:r>
               <a:rPr lang="fr-FR" dirty="0" smtClean="0"/>
-              <a:t>	</a:t>
-            </a:r>
-            <a:endParaRPr lang="fr-FR" dirty="0" smtClean="0"/>
-          </a:p>
-          <a:p>
-            <a:pPr lvl="1"/>
-            <a:r>
-              <a:rPr lang="fr-FR" dirty="0" smtClean="0"/>
-              <a:t>Eclipse </a:t>
-            </a:r>
-            <a:r>
-              <a:rPr lang="fr-FR" dirty="0" smtClean="0"/>
-              <a:t> </a:t>
-            </a:r>
-            <a:endParaRPr lang="fr-FR" dirty="0" smtClean="0"/>
+              <a:t>Eclipse  </a:t>
+            </a:r>
           </a:p>
           <a:p>
             <a:pPr lvl="1"/>
@@ -8214,13 +8199,8 @@
             </a:r>
             <a:r>
               <a:rPr lang="fr-FR" dirty="0" smtClean="0"/>
-              <a:t> </a:t>
-            </a:r>
-            <a:r>
-              <a:rPr lang="fr-FR" dirty="0" smtClean="0"/>
-              <a:t> </a:t>
-            </a:r>
-            <a:endParaRPr lang="fr-FR" dirty="0" smtClean="0"/>
+              <a:t>  </a:t>
+            </a:r>
           </a:p>
           <a:p>
             <a:pPr lvl="1"/>
@@ -8672,11 +8652,7 @@
           <a:p>
             <a:r>
               <a:rPr lang="fr-FR" dirty="0" smtClean="0"/>
-              <a:t>Modèle </a:t>
-            </a:r>
-            <a:r>
-              <a:rPr lang="fr-FR" dirty="0" smtClean="0"/>
-              <a:t>PSM </a:t>
+              <a:t>Modèle PSM </a:t>
             </a:r>
             <a:endParaRPr lang="fr-FR" dirty="0"/>
           </a:p>

</xml_diff>